<commit_message>
what does this do
</commit_message>
<xml_diff>
--- a/02-Git and Data Types/2-Version Control.pptx
+++ b/02-Git and Data Types/2-Version Control.pptx
@@ -480,7 +480,7 @@
             <a:fld id="{B1986778-4955-48BF-B9A5-723767A6F1B2}" type="datetimeFigureOut">
               <a:rPr lang="en-US" smtClean="0"/>
               <a:pPr/>
-              <a:t>1/16/2017</a:t>
+              <a:t>1/18/2018</a:t>
             </a:fld>
             <a:endParaRPr lang="en-GB" dirty="0"/>
           </a:p>
@@ -4386,8 +4386,29 @@
                   <a:schemeClr val="bg1"/>
                 </a:solidFill>
               </a:rPr>
-              <a:t>16 Jan 2017</a:t>
-            </a:r>
+              <a:t>16 </a:t>
+            </a:r>
+            <a:r>
+              <a:rPr lang="en-GB" sz="2000" kern="0">
+                <a:solidFill>
+                  <a:schemeClr val="bg1"/>
+                </a:solidFill>
+              </a:rPr>
+              <a:t>Jan </a:t>
+            </a:r>
+            <a:r>
+              <a:rPr lang="en-GB" sz="2000" kern="0" smtClean="0">
+                <a:solidFill>
+                  <a:schemeClr val="bg1"/>
+                </a:solidFill>
+              </a:rPr>
+              <a:t>2018</a:t>
+            </a:r>
+            <a:endParaRPr lang="en-GB" sz="2000" kern="0" dirty="0">
+              <a:solidFill>
+                <a:schemeClr val="bg1"/>
+              </a:solidFill>
+            </a:endParaRPr>
           </a:p>
         </p:txBody>
       </p:sp>

</xml_diff>